<commit_message>
MIN: Adjusting slides for hydrological modelling.
</commit_message>
<xml_diff>
--- a/Termin_4/folien/UebungModellierung#4.pptx
+++ b/Termin_4/folien/UebungModellierung#4.pptx
@@ -403,7 +403,7 @@
     </p:spTree>
     <p:extLst>
       <p:ext uri="{BB962C8B-B14F-4D97-AF65-F5344CB8AC3E}">
-        <p14:creationId xmlns="" xmlns:p14="http://schemas.microsoft.com/office/powerpoint/2010/main" val="1882660213"/>
+        <p14:creationId xmlns:p14="http://schemas.microsoft.com/office/powerpoint/2010/main" xmlns="" val="1882660213"/>
       </p:ext>
     </p:extLst>
   </p:cSld>
@@ -742,7 +742,7 @@
     </p:spTree>
     <p:extLst>
       <p:ext uri="{BB962C8B-B14F-4D97-AF65-F5344CB8AC3E}">
-        <p14:creationId xmlns="" xmlns:p14="http://schemas.microsoft.com/office/powerpoint/2010/main" val="2781074432"/>
+        <p14:creationId xmlns:p14="http://schemas.microsoft.com/office/powerpoint/2010/main" xmlns="" val="2781074432"/>
       </p:ext>
     </p:extLst>
   </p:cSld>
@@ -18778,13 +18778,7 @@
               <a:rPr lang="de-DE" sz="2400" dirty="0" smtClean="0">
                 <a:latin typeface="Calibri" pitchFamily="34" charset="0"/>
               </a:rPr>
-              <a:t>Modell</a:t>
-            </a:r>
-            <a:r>
-              <a:rPr lang="de-DE" sz="2400" dirty="0" smtClean="0">
-                <a:latin typeface="Calibri" pitchFamily="34" charset="0"/>
-              </a:rPr>
-              <a:t>?</a:t>
+              <a:t>Modell?</a:t>
             </a:r>
           </a:p>
         </p:txBody>
@@ -18838,13 +18832,7 @@
               <a:rPr lang="de-DE" sz="2400" dirty="0" smtClean="0">
                 <a:latin typeface="Calibri" pitchFamily="34" charset="0"/>
               </a:rPr>
-              <a:t>Modells</a:t>
-            </a:r>
-            <a:r>
-              <a:rPr lang="de-DE" sz="2400" dirty="0" smtClean="0">
-                <a:latin typeface="Calibri" pitchFamily="34" charset="0"/>
-              </a:rPr>
-              <a:t>?</a:t>
+              <a:t>Modells?</a:t>
             </a:r>
           </a:p>
         </p:txBody>
@@ -19390,8 +19378,17 @@
               <a:rPr lang="de-DE" sz="2400" dirty="0" smtClean="0">
                 <a:latin typeface="Calibri" pitchFamily="34" charset="0"/>
               </a:rPr>
-              <a:t>R als Werkzeug in der Modellierung</a:t>
-            </a:r>
+              <a:t>R als Werkzeug in der </a:t>
+            </a:r>
+            <a:r>
+              <a:rPr lang="de-DE" sz="2400" dirty="0" smtClean="0">
+                <a:latin typeface="Calibri" pitchFamily="34" charset="0"/>
+              </a:rPr>
+              <a:t>Modellierung </a:t>
+            </a:r>
+            <a:endParaRPr lang="de-DE" sz="2400" dirty="0" smtClean="0">
+              <a:latin typeface="Calibri" pitchFamily="34" charset="0"/>
+            </a:endParaRPr>
           </a:p>
           <a:p>
             <a:pPr marL="269875" indent="-269875" algn="ctr">
@@ -19400,6 +19397,25 @@
               </a:spcAft>
             </a:pPr>
             <a:r>
+              <a:rPr lang="de-DE" sz="2400" dirty="0" smtClean="0">
+                <a:latin typeface="Calibri" pitchFamily="34" charset="0"/>
+              </a:rPr>
+              <a:t>Ökologische </a:t>
+            </a:r>
+            <a:r>
+              <a:rPr lang="de-DE" sz="2400" dirty="0" smtClean="0">
+                <a:latin typeface="Calibri" pitchFamily="34" charset="0"/>
+              </a:rPr>
+              <a:t>Modelle</a:t>
+            </a:r>
+          </a:p>
+          <a:p>
+            <a:pPr marL="269875" indent="-269875" algn="ctr">
+              <a:spcAft>
+                <a:spcPts val="600"/>
+              </a:spcAft>
+            </a:pPr>
+            <a:r>
               <a:rPr lang="de-DE" sz="2400" b="1" dirty="0" smtClean="0">
                 <a:solidFill>
                   <a:srgbClr val="00B050"/>
@@ -19408,25 +19424,9 @@
               </a:rPr>
               <a:t>Hydrologische Modelle</a:t>
             </a:r>
-            <a:r>
-              <a:rPr lang="de-DE" sz="2400" dirty="0" smtClean="0">
-                <a:latin typeface="Calibri" pitchFamily="34" charset="0"/>
-              </a:rPr>
-              <a:t> </a:t>
-            </a:r>
-          </a:p>
-          <a:p>
-            <a:pPr marL="269875" indent="-269875" algn="ctr">
-              <a:spcAft>
-                <a:spcPts val="600"/>
-              </a:spcAft>
-            </a:pPr>
-            <a:r>
-              <a:rPr lang="de-DE" sz="2400" dirty="0" smtClean="0">
-                <a:latin typeface="Calibri" pitchFamily="34" charset="0"/>
-              </a:rPr>
-              <a:t>Ökologische Modelle</a:t>
-            </a:r>
+            <a:endParaRPr lang="de-DE" sz="2400" dirty="0" smtClean="0">
+              <a:latin typeface="Calibri" pitchFamily="34" charset="0"/>
+            </a:endParaRPr>
           </a:p>
           <a:p>
             <a:pPr marL="269875" indent="-269875" algn="ctr">

</xml_diff>

<commit_message>
Revision of codefights for Termin 4 and 5.
</commit_message>
<xml_diff>
--- a/Termin_4/folien/UebungModellierung#4.pptx
+++ b/Termin_4/folien/UebungModellierung#4.pptx
@@ -403,7 +403,7 @@
     </p:spTree>
     <p:extLst>
       <p:ext uri="{BB962C8B-B14F-4D97-AF65-F5344CB8AC3E}">
-        <p14:creationId xmlns:p14="http://schemas.microsoft.com/office/powerpoint/2010/main" xmlns="" val="1882660213"/>
+        <p14:creationId xmlns="" xmlns:p14="http://schemas.microsoft.com/office/powerpoint/2010/main" val="1882660213"/>
       </p:ext>
     </p:extLst>
   </p:cSld>
@@ -742,7 +742,7 @@
     </p:spTree>
     <p:extLst>
       <p:ext uri="{BB962C8B-B14F-4D97-AF65-F5344CB8AC3E}">
-        <p14:creationId xmlns:p14="http://schemas.microsoft.com/office/powerpoint/2010/main" xmlns="" val="2781074432"/>
+        <p14:creationId xmlns="" xmlns:p14="http://schemas.microsoft.com/office/powerpoint/2010/main" val="2781074432"/>
       </p:ext>
     </p:extLst>
   </p:cSld>
@@ -12852,7 +12852,16 @@
                 </a:solidFill>
                 <a:latin typeface="Calibri" pitchFamily="34" charset="0"/>
               </a:rPr>
-              <a:t>= a </a:t>
+              <a:t>= </a:t>
+            </a:r>
+            <a:r>
+              <a:rPr lang="de-DE" sz="2000" dirty="0" smtClean="0">
+                <a:solidFill>
+                  <a:srgbClr val="C00000"/>
+                </a:solidFill>
+                <a:latin typeface="Calibri" pitchFamily="34" charset="0"/>
+              </a:rPr>
+              <a:t>b </a:t>
             </a:r>
             <a:r>
               <a:rPr lang="de-DE" sz="2000" baseline="30000" dirty="0" smtClean="0">
@@ -12919,7 +12928,16 @@
                 </a:solidFill>
                 <a:latin typeface="Calibri" pitchFamily="34" charset="0"/>
               </a:rPr>
-              <a:t>= b </a:t>
+              <a:t>= </a:t>
+            </a:r>
+            <a:r>
+              <a:rPr lang="de-DE" sz="2000" dirty="0" smtClean="0">
+                <a:solidFill>
+                  <a:srgbClr val="C00000"/>
+                </a:solidFill>
+                <a:latin typeface="Calibri" pitchFamily="34" charset="0"/>
+              </a:rPr>
+              <a:t>a </a:t>
             </a:r>
             <a:r>
               <a:rPr lang="de-DE" sz="2000" baseline="30000" dirty="0" smtClean="0">
@@ -15429,7 +15447,16 @@
                 </a:solidFill>
                 <a:latin typeface="Calibri" pitchFamily="34" charset="0"/>
               </a:rPr>
-              <a:t>= a </a:t>
+              <a:t>= </a:t>
+            </a:r>
+            <a:r>
+              <a:rPr lang="de-DE" sz="2000" dirty="0" smtClean="0">
+                <a:solidFill>
+                  <a:srgbClr val="C00000"/>
+                </a:solidFill>
+                <a:latin typeface="Calibri" pitchFamily="34" charset="0"/>
+              </a:rPr>
+              <a:t>b </a:t>
             </a:r>
             <a:r>
               <a:rPr lang="de-DE" sz="2000" baseline="30000" dirty="0" smtClean="0">
@@ -15496,7 +15523,16 @@
                 </a:solidFill>
                 <a:latin typeface="Calibri" pitchFamily="34" charset="0"/>
               </a:rPr>
-              <a:t>= b </a:t>
+              <a:t>= </a:t>
+            </a:r>
+            <a:r>
+              <a:rPr lang="de-DE" sz="2000" dirty="0" smtClean="0">
+                <a:solidFill>
+                  <a:srgbClr val="C00000"/>
+                </a:solidFill>
+                <a:latin typeface="Calibri" pitchFamily="34" charset="0"/>
+              </a:rPr>
+              <a:t>a </a:t>
             </a:r>
             <a:r>
               <a:rPr lang="de-DE" sz="2000" baseline="30000" dirty="0" smtClean="0">
@@ -17355,7 +17391,16 @@
                 </a:solidFill>
                 <a:latin typeface="Calibri" pitchFamily="34" charset="0"/>
               </a:rPr>
-              <a:t>= a </a:t>
+              <a:t>= </a:t>
+            </a:r>
+            <a:r>
+              <a:rPr lang="de-DE" sz="2000" dirty="0" smtClean="0">
+                <a:solidFill>
+                  <a:srgbClr val="C00000"/>
+                </a:solidFill>
+                <a:latin typeface="Calibri" pitchFamily="34" charset="0"/>
+              </a:rPr>
+              <a:t>b </a:t>
             </a:r>
             <a:r>
               <a:rPr lang="de-DE" sz="2000" baseline="30000" dirty="0" smtClean="0">
@@ -17422,7 +17467,16 @@
                 </a:solidFill>
                 <a:latin typeface="Calibri" pitchFamily="34" charset="0"/>
               </a:rPr>
-              <a:t>= b </a:t>
+              <a:t>= </a:t>
+            </a:r>
+            <a:r>
+              <a:rPr lang="de-DE" sz="2000" dirty="0" smtClean="0">
+                <a:solidFill>
+                  <a:srgbClr val="C00000"/>
+                </a:solidFill>
+                <a:latin typeface="Calibri" pitchFamily="34" charset="0"/>
+              </a:rPr>
+              <a:t>a </a:t>
             </a:r>
             <a:r>
               <a:rPr lang="de-DE" sz="2000" baseline="30000" dirty="0" smtClean="0">
@@ -18650,8 +18704,8 @@
         </p:nvSpPr>
         <p:spPr>
           <a:xfrm>
-            <a:off x="474140" y="2348880"/>
-            <a:ext cx="288000" cy="1354217"/>
+            <a:off x="323528" y="2358405"/>
+            <a:ext cx="425452" cy="1354217"/>
           </a:xfrm>
           <a:prstGeom prst="rect">
             <a:avLst/>
@@ -18666,7 +18720,7 @@
           </a:bodyPr>
           <a:lstStyle/>
           <a:p>
-            <a:pPr marL="355600" indent="-355600" algn="ctr">
+            <a:pPr marL="355600" indent="-355600" algn="r">
               <a:spcAft>
                 <a:spcPts val="600"/>
               </a:spcAft>
@@ -18683,7 +18737,7 @@
             </a:r>
           </a:p>
           <a:p>
-            <a:pPr marL="355600" indent="-355600">
+            <a:pPr marL="355600" indent="-355600" algn="r">
               <a:spcAft>
                 <a:spcPts val="600"/>
               </a:spcAft>
@@ -18696,15 +18750,22 @@
               <a:t> </a:t>
             </a:r>
             <a:r>
-              <a:rPr lang="de-DE" sz="2400" b="1" dirty="0" smtClean="0">
+              <a:rPr lang="de-DE" sz="2400" dirty="0" smtClean="0">
+                <a:solidFill>
+                  <a:srgbClr val="C00000"/>
+                </a:solidFill>
                 <a:latin typeface="Calibri" pitchFamily="34" charset="0"/>
                 <a:sym typeface="Wingdings"/>
               </a:rPr>
-              <a:t>?</a:t>
-            </a:r>
-          </a:p>
-          <a:p>
-            <a:pPr marL="355600" indent="-355600" algn="ctr">
+              <a:t></a:t>
+            </a:r>
+            <a:endParaRPr lang="de-DE" sz="2400" b="1" dirty="0" smtClean="0">
+              <a:latin typeface="Calibri" pitchFamily="34" charset="0"/>
+              <a:sym typeface="Wingdings"/>
+            </a:endParaRPr>
+          </a:p>
+          <a:p>
+            <a:pPr marL="355600" indent="-355600" algn="r">
               <a:spcAft>
                 <a:spcPts val="600"/>
               </a:spcAft>
@@ -19378,17 +19439,8 @@
               <a:rPr lang="de-DE" sz="2400" dirty="0" smtClean="0">
                 <a:latin typeface="Calibri" pitchFamily="34" charset="0"/>
               </a:rPr>
-              <a:t>R als Werkzeug in der </a:t>
-            </a:r>
-            <a:r>
-              <a:rPr lang="de-DE" sz="2400" dirty="0" smtClean="0">
-                <a:latin typeface="Calibri" pitchFamily="34" charset="0"/>
-              </a:rPr>
-              <a:t>Modellierung </a:t>
-            </a:r>
-            <a:endParaRPr lang="de-DE" sz="2400" dirty="0" smtClean="0">
-              <a:latin typeface="Calibri" pitchFamily="34" charset="0"/>
-            </a:endParaRPr>
+              <a:t>R als Werkzeug in der Modellierung </a:t>
+            </a:r>
           </a:p>
           <a:p>
             <a:pPr marL="269875" indent="-269875" algn="ctr">
@@ -19400,13 +19452,7 @@
               <a:rPr lang="de-DE" sz="2400" dirty="0" smtClean="0">
                 <a:latin typeface="Calibri" pitchFamily="34" charset="0"/>
               </a:rPr>
-              <a:t>Ökologische </a:t>
-            </a:r>
-            <a:r>
-              <a:rPr lang="de-DE" sz="2400" dirty="0" smtClean="0">
-                <a:latin typeface="Calibri" pitchFamily="34" charset="0"/>
-              </a:rPr>
-              <a:t>Modelle</a:t>
+              <a:t>Ökologische Modelle</a:t>
             </a:r>
           </a:p>
           <a:p>

</xml_diff>